<commit_message>
add pres pdf group 4
</commit_message>
<xml_diff>
--- a/groups/04-logMerge/presihalbzeit.pptx
+++ b/groups/04-logMerge/presihalbzeit.pptx
@@ -11,6 +11,7 @@
     <p:sldId id="261" r:id="rId5"/>
     <p:sldId id="262" r:id="rId6"/>
     <p:sldId id="264" r:id="rId7"/>
+    <p:sldId id="265" r:id="rId8"/>
   </p:sldIdLst>
   <p:sldSz cx="12192000" cy="6858000"/>
   <p:notesSz cx="6858000" cy="9144000"/>
@@ -109,6 +110,11 @@
       </a:defRPr>
     </a:lvl9pPr>
   </p:defaultTextStyle>
+  <p:extLst>
+    <p:ext uri="{EFAFB233-063F-42B5-8137-9DF3F51BA10A}">
+      <p15:sldGuideLst xmlns:p15="http://schemas.microsoft.com/office/powerpoint/2012/main"/>
+    </p:ext>
+  </p:extLst>
 </p:presentation>
 </file>
 
@@ -207,7 +213,7 @@
           <a:effectLst/>
           <a:extLst>
             <a:ext uri="{91240B29-F687-4f45-9708-019B960494DF}">
-              <a14:hiddenLine xmlns:a14="http://schemas.microsoft.com/office/drawing/2010/main" xmlns="" w="9525">
+              <a14:hiddenLine xmlns="" xmlns:a14="http://schemas.microsoft.com/office/drawing/2010/main" w="9525">
                 <a:solidFill>
                   <a:srgbClr val="000000"/>
                 </a:solidFill>
@@ -400,7 +406,7 @@
             <a:fld id="{08B9EBBA-996F-894A-B54A-D6246ED52CEA}" type="datetimeFigureOut">
               <a:rPr lang="en-US" dirty="0"/>
               <a:pPr/>
-              <a:t>4/14/2020</a:t>
+              <a:t>4/16/2020</a:t>
             </a:fld>
             <a:endParaRPr lang="en-US" dirty="0"/>
           </a:p>
@@ -715,7 +721,7 @@
             <a:fld id="{18C79C5D-2A6F-F04D-97DA-BEF2467B64E4}" type="datetimeFigureOut">
               <a:rPr lang="en-US" dirty="0"/>
               <a:pPr/>
-              <a:t>4/14/2020</a:t>
+              <a:t>4/16/2020</a:t>
             </a:fld>
             <a:endParaRPr lang="en-US" dirty="0"/>
           </a:p>
@@ -1200,7 +1206,7 @@
             <a:fld id="{8DFA1846-DA80-1C48-A609-854EA85C59AD}" type="datetimeFigureOut">
               <a:rPr lang="en-US" dirty="0"/>
               <a:pPr/>
-              <a:t>4/14/2020</a:t>
+              <a:t>4/16/2020</a:t>
             </a:fld>
             <a:endParaRPr lang="en-US" dirty="0"/>
           </a:p>
@@ -1566,7 +1572,7 @@
             <a:fld id="{FBF54567-0DE4-3F47-BF90-CB84690072F9}" type="datetimeFigureOut">
               <a:rPr lang="en-US" dirty="0"/>
               <a:pPr/>
-              <a:t>4/14/2020</a:t>
+              <a:t>4/16/2020</a:t>
             </a:fld>
             <a:endParaRPr lang="en-US" dirty="0"/>
           </a:p>
@@ -1717,7 +1723,7 @@
           <a:ln/>
           <a:extLst>
             <a:ext uri="{91240B29-F687-4f45-9708-019B960494DF}">
-              <a14:hiddenLine xmlns:a14="http://schemas.microsoft.com/office/drawing/2010/main" xmlns="" w="9525">
+              <a14:hiddenLine xmlns="" xmlns:a14="http://schemas.microsoft.com/office/drawing/2010/main" w="9525">
                 <a:solidFill>
                   <a:srgbClr val="000000"/>
                 </a:solidFill>
@@ -1836,7 +1842,7 @@
             <a:fld id="{C6C52C72-DE31-F449-A4ED-4C594FD91407}" type="datetimeFigureOut">
               <a:rPr lang="en-US" dirty="0"/>
               <a:pPr/>
-              <a:t>4/14/2020</a:t>
+              <a:t>4/16/2020</a:t>
             </a:fld>
             <a:endParaRPr lang="en-US" dirty="0"/>
           </a:p>
@@ -1989,7 +1995,7 @@
           <a:ln/>
           <a:extLst>
             <a:ext uri="{91240B29-F687-4f45-9708-019B960494DF}">
-              <a14:hiddenLine xmlns:a14="http://schemas.microsoft.com/office/drawing/2010/main" xmlns="" w="9525">
+              <a14:hiddenLine xmlns="" xmlns:a14="http://schemas.microsoft.com/office/drawing/2010/main" w="9525">
                 <a:solidFill>
                   <a:srgbClr val="000000"/>
                 </a:solidFill>
@@ -2118,7 +2124,7 @@
             <a:fld id="{ED62726E-379B-B349-9EED-81ED093FA806}" type="datetimeFigureOut">
               <a:rPr lang="en-US" dirty="0"/>
               <a:pPr/>
-              <a:t>4/14/2020</a:t>
+              <a:t>4/16/2020</a:t>
             </a:fld>
             <a:endParaRPr lang="en-US" dirty="0"/>
           </a:p>
@@ -2269,7 +2275,7 @@
           <a:ln/>
           <a:extLst>
             <a:ext uri="{91240B29-F687-4f45-9708-019B960494DF}">
-              <a14:hiddenLine xmlns:a14="http://schemas.microsoft.com/office/drawing/2010/main" xmlns="" w="9525">
+              <a14:hiddenLine xmlns="" xmlns:a14="http://schemas.microsoft.com/office/drawing/2010/main" w="9525">
                 <a:solidFill>
                   <a:srgbClr val="000000"/>
                 </a:solidFill>
@@ -2398,7 +2404,7 @@
             <a:fld id="{9B3A1323-8D79-1946-B0D7-40001CF92E9D}" type="datetimeFigureOut">
               <a:rPr lang="en-US" dirty="0"/>
               <a:pPr/>
-              <a:t>4/14/2020</a:t>
+              <a:t>4/16/2020</a:t>
             </a:fld>
             <a:endParaRPr lang="en-US" dirty="0"/>
           </a:p>
@@ -2738,7 +2744,7 @@
             <a:fld id="{8DFA1846-DA80-1C48-A609-854EA85C59AD}" type="datetimeFigureOut">
               <a:rPr lang="en-US" dirty="0"/>
               <a:pPr/>
-              <a:t>4/14/2020</a:t>
+              <a:t>4/16/2020</a:t>
             </a:fld>
             <a:endParaRPr lang="en-US" dirty="0"/>
           </a:p>
@@ -2889,7 +2895,7 @@
           <a:ln/>
           <a:extLst>
             <a:ext uri="{91240B29-F687-4f45-9708-019B960494DF}">
-              <a14:hiddenLine xmlns:a14="http://schemas.microsoft.com/office/drawing/2010/main" xmlns="" w="9525">
+              <a14:hiddenLine xmlns="" xmlns:a14="http://schemas.microsoft.com/office/drawing/2010/main" w="9525">
                 <a:solidFill>
                   <a:srgbClr val="000000"/>
                 </a:solidFill>
@@ -3074,7 +3080,7 @@
             <a:fld id="{57302355-E14B-8545-A8F8-0FE83CC9D524}" type="datetimeFigureOut">
               <a:rPr lang="en-US" dirty="0"/>
               <a:pPr/>
-              <a:t>4/14/2020</a:t>
+              <a:t>4/16/2020</a:t>
             </a:fld>
             <a:endParaRPr lang="en-US" dirty="0"/>
           </a:p>
@@ -3225,7 +3231,7 @@
           <a:ln/>
           <a:extLst>
             <a:ext uri="{91240B29-F687-4f45-9708-019B960494DF}">
-              <a14:hiddenLine xmlns:a14="http://schemas.microsoft.com/office/drawing/2010/main" xmlns="" w="9525">
+              <a14:hiddenLine xmlns="" xmlns:a14="http://schemas.microsoft.com/office/drawing/2010/main" w="9525">
                 <a:solidFill>
                   <a:srgbClr val="000000"/>
                 </a:solidFill>
@@ -3548,7 +3554,7 @@
             <a:fld id="{02640F58-564D-2B4F-AE67-E407BA4FCF45}" type="datetimeFigureOut">
               <a:rPr lang="en-US" dirty="0"/>
               <a:pPr/>
-              <a:t>4/14/2020</a:t>
+              <a:t>4/16/2020</a:t>
             </a:fld>
             <a:endParaRPr lang="en-US" dirty="0"/>
           </a:p>
@@ -3699,7 +3705,7 @@
           <a:ln/>
           <a:extLst>
             <a:ext uri="{91240B29-F687-4f45-9708-019B960494DF}">
-              <a14:hiddenLine xmlns:a14="http://schemas.microsoft.com/office/drawing/2010/main" xmlns="" w="9525">
+              <a14:hiddenLine xmlns="" xmlns:a14="http://schemas.microsoft.com/office/drawing/2010/main" w="9525">
                 <a:solidFill>
                   <a:srgbClr val="000000"/>
                 </a:solidFill>
@@ -3766,7 +3772,7 @@
             <a:fld id="{F13A34C8-038E-2045-AF43-DF7DBB8E0E9E}" type="datetimeFigureOut">
               <a:rPr lang="en-US" dirty="0"/>
               <a:pPr/>
-              <a:t>4/14/2020</a:t>
+              <a:t>4/16/2020</a:t>
             </a:fld>
             <a:endParaRPr lang="en-US" dirty="0"/>
           </a:p>
@@ -3858,7 +3864,7 @@
             <a:fld id="{8818C68F-D26B-8F47-958C-23B49CF8A634}" type="datetimeFigureOut">
               <a:rPr lang="en-US" dirty="0"/>
               <a:pPr/>
-              <a:t>4/14/2020</a:t>
+              <a:t>4/16/2020</a:t>
             </a:fld>
             <a:endParaRPr lang="en-US" dirty="0"/>
           </a:p>
@@ -4122,7 +4128,7 @@
           <a:ln/>
           <a:extLst>
             <a:ext uri="{91240B29-F687-4f45-9708-019B960494DF}">
-              <a14:hiddenLine xmlns:a14="http://schemas.microsoft.com/office/drawing/2010/main" xmlns="" w="9525">
+              <a14:hiddenLine xmlns="" xmlns:a14="http://schemas.microsoft.com/office/drawing/2010/main" w="9525">
                 <a:solidFill>
                   <a:srgbClr val="000000"/>
                 </a:solidFill>
@@ -4322,7 +4328,7 @@
             <a:fld id="{D0DF5E60-9974-AC48-9591-99C2BB44B7CF}" type="datetimeFigureOut">
               <a:rPr lang="en-US" dirty="0"/>
               <a:pPr/>
-              <a:t>4/14/2020</a:t>
+              <a:t>4/16/2020</a:t>
             </a:fld>
             <a:endParaRPr lang="en-US" dirty="0"/>
           </a:p>
@@ -4632,7 +4638,7 @@
             <a:fld id="{18C79C5D-2A6F-F04D-97DA-BEF2467B64E4}" type="datetimeFigureOut">
               <a:rPr lang="en-US" dirty="0"/>
               <a:pPr/>
-              <a:t>4/14/2020</a:t>
+              <a:t>4/16/2020</a:t>
             </a:fld>
             <a:endParaRPr lang="en-US" dirty="0"/>
           </a:p>
@@ -4899,7 +4905,7 @@
             <a:fld id="{09B482E8-6E0E-1B4F-B1FD-C69DB9E858D9}" type="datetimeFigureOut">
               <a:rPr lang="en-US" dirty="0"/>
               <a:pPr/>
-              <a:t>4/14/2020</a:t>
+              <a:t>4/16/2020</a:t>
             </a:fld>
             <a:endParaRPr lang="en-US" dirty="0"/>
           </a:p>
@@ -6104,7 +6110,7 @@
           <a:p>
             <a:r>
               <a:rPr lang="en-US" dirty="0"/>
-              <a:t>(Gruppen 1, 13, 14)</a:t>
+              <a:t>(Gruppen 1 und 13)</a:t>
             </a:r>
             <a:endParaRPr lang="en-DE" dirty="0"/>
           </a:p>
@@ -6696,7 +6702,7 @@
           <a:p>
             <a:r>
               <a:rPr lang="en-US" dirty="0"/>
-              <a:t>(Gruppen 1, 13, 14)</a:t>
+              <a:t>(Gruppen 1 und 13)</a:t>
             </a:r>
             <a:endParaRPr lang="en-DE" dirty="0"/>
           </a:p>
@@ -8299,6 +8305,223 @@
     <p:extLst>
       <p:ext uri="{BB962C8B-B14F-4D97-AF65-F5344CB8AC3E}">
         <p14:creationId xmlns:p14="http://schemas.microsoft.com/office/powerpoint/2010/main" val="3042148466"/>
+      </p:ext>
+    </p:extLst>
+  </p:cSld>
+  <p:clrMapOvr>
+    <a:masterClrMapping/>
+  </p:clrMapOvr>
+</p:sld>
+</file>
+
+<file path=ppt/slides/slide7.xml><?xml version="1.0" encoding="utf-8"?>
+<p:sld xmlns:a="http://schemas.openxmlformats.org/drawingml/2006/main" xmlns:r="http://schemas.openxmlformats.org/officeDocument/2006/relationships" xmlns:p="http://schemas.openxmlformats.org/presentationml/2006/main">
+  <p:cSld>
+    <p:spTree>
+      <p:nvGrpSpPr>
+        <p:cNvPr id="1" name=""/>
+        <p:cNvGrpSpPr/>
+        <p:nvPr/>
+      </p:nvGrpSpPr>
+      <p:grpSpPr>
+        <a:xfrm>
+          <a:off x="0" y="0"/>
+          <a:ext cx="0" cy="0"/>
+          <a:chOff x="0" y="0"/>
+          <a:chExt cx="0" cy="0"/>
+        </a:xfrm>
+      </p:grpSpPr>
+      <p:sp>
+        <p:nvSpPr>
+          <p:cNvPr id="2" name="Title 1">
+            <a:extLst>
+              <a:ext uri="{FF2B5EF4-FFF2-40B4-BE49-F238E27FC236}">
+                <a16:creationId xmlns:a16="http://schemas.microsoft.com/office/drawing/2014/main" id="{704FD4F2-AD6D-47FE-AE4F-6EC0DA4BA626}"/>
+              </a:ext>
+            </a:extLst>
+          </p:cNvPr>
+          <p:cNvSpPr>
+            <a:spLocks noGrp="1"/>
+          </p:cNvSpPr>
+          <p:nvPr>
+            <p:ph type="title"/>
+          </p:nvPr>
+        </p:nvSpPr>
+        <p:spPr/>
+        <p:txBody>
+          <a:bodyPr/>
+          <a:lstStyle/>
+          <a:p>
+            <a:r>
+              <a:rPr lang="en-US" dirty="0" err="1"/>
+              <a:t>Aufrufen</a:t>
+            </a:r>
+            <a:r>
+              <a:rPr lang="en-US" dirty="0"/>
+              <a:t> </a:t>
+            </a:r>
+            <a:r>
+              <a:rPr lang="en-US" dirty="0" err="1"/>
+              <a:t>unseres</a:t>
+            </a:r>
+            <a:r>
+              <a:rPr lang="en-US" dirty="0"/>
+              <a:t> </a:t>
+            </a:r>
+            <a:r>
+              <a:rPr lang="en-US" dirty="0" err="1"/>
+              <a:t>Skripts</a:t>
+            </a:r>
+            <a:endParaRPr lang="en-DE" dirty="0"/>
+          </a:p>
+        </p:txBody>
+      </p:sp>
+      <p:sp>
+        <p:nvSpPr>
+          <p:cNvPr id="3" name="Content Placeholder 2">
+            <a:extLst>
+              <a:ext uri="{FF2B5EF4-FFF2-40B4-BE49-F238E27FC236}">
+                <a16:creationId xmlns:a16="http://schemas.microsoft.com/office/drawing/2014/main" id="{144B927A-1F89-4F8C-8360-C704D3B8CE84}"/>
+              </a:ext>
+            </a:extLst>
+          </p:cNvPr>
+          <p:cNvSpPr>
+            <a:spLocks noGrp="1"/>
+          </p:cNvSpPr>
+          <p:nvPr>
+            <p:ph idx="1"/>
+          </p:nvPr>
+        </p:nvSpPr>
+        <p:spPr/>
+        <p:txBody>
+          <a:bodyPr/>
+          <a:lstStyle/>
+          <a:p>
+            <a:r>
+              <a:rPr lang="en-US" dirty="0" err="1"/>
+              <a:t>Skript</a:t>
+            </a:r>
+            <a:r>
+              <a:rPr lang="en-US" dirty="0"/>
+              <a:t> </a:t>
+            </a:r>
+            <a:r>
+              <a:rPr lang="en-US" dirty="0" err="1"/>
+              <a:t>ist</a:t>
+            </a:r>
+            <a:r>
+              <a:rPr lang="en-US" dirty="0"/>
+              <a:t> in user-directory </a:t>
+            </a:r>
+            <a:r>
+              <a:rPr lang="en-US" dirty="0" err="1"/>
+              <a:t>gespeichert</a:t>
+            </a:r>
+            <a:r>
+              <a:rPr lang="en-US" dirty="0"/>
+              <a:t> (Onboarding!)</a:t>
+            </a:r>
+          </a:p>
+          <a:p>
+            <a:endParaRPr lang="en-US" dirty="0"/>
+          </a:p>
+          <a:p>
+            <a:pPr marL="0" indent="0">
+              <a:buNone/>
+            </a:pPr>
+            <a:r>
+              <a:rPr lang="en-US" dirty="0"/>
+              <a:t>Von </a:t>
+            </a:r>
+            <a:r>
+              <a:rPr lang="en-US" dirty="0" err="1"/>
+              <a:t>unten</a:t>
+            </a:r>
+            <a:r>
+              <a:rPr lang="en-US" dirty="0"/>
+              <a:t> </a:t>
+            </a:r>
+            <a:r>
+              <a:rPr lang="en-US" dirty="0" err="1"/>
+              <a:t>nach</a:t>
+            </a:r>
+            <a:r>
+              <a:rPr lang="en-US" dirty="0"/>
+              <a:t> </a:t>
+            </a:r>
+            <a:r>
+              <a:rPr lang="en-US" dirty="0" err="1"/>
+              <a:t>oben</a:t>
+            </a:r>
+            <a:r>
+              <a:rPr lang="en-US" dirty="0"/>
+              <a:t>: </a:t>
+            </a:r>
+          </a:p>
+          <a:p>
+            <a:r>
+              <a:rPr lang="en-US" dirty="0"/>
+              <a:t>python3 logMerge.py –send </a:t>
+            </a:r>
+            <a:r>
+              <a:rPr lang="en-US" dirty="0" err="1"/>
+              <a:t>PfadZuPcapFiles</a:t>
+            </a:r>
+            <a:endParaRPr lang="en-US" dirty="0"/>
+          </a:p>
+          <a:p>
+            <a:endParaRPr lang="en-US" dirty="0"/>
+          </a:p>
+          <a:p>
+            <a:pPr marL="0" indent="0">
+              <a:buNone/>
+            </a:pPr>
+            <a:r>
+              <a:rPr lang="en-US" dirty="0"/>
+              <a:t>Von </a:t>
+            </a:r>
+            <a:r>
+              <a:rPr lang="en-US" dirty="0" err="1"/>
+              <a:t>oben</a:t>
+            </a:r>
+            <a:r>
+              <a:rPr lang="en-US" dirty="0"/>
+              <a:t> </a:t>
+            </a:r>
+            <a:r>
+              <a:rPr lang="en-US" dirty="0" err="1"/>
+              <a:t>nach</a:t>
+            </a:r>
+            <a:r>
+              <a:rPr lang="en-US" dirty="0"/>
+              <a:t> </a:t>
+            </a:r>
+            <a:r>
+              <a:rPr lang="en-US" dirty="0" err="1"/>
+              <a:t>unten</a:t>
+            </a:r>
+            <a:r>
+              <a:rPr lang="en-US" dirty="0"/>
+              <a:t>:</a:t>
+            </a:r>
+          </a:p>
+          <a:p>
+            <a:r>
+              <a:rPr lang="en-US" dirty="0"/>
+              <a:t>python3 logMerge.py -get </a:t>
+            </a:r>
+            <a:r>
+              <a:rPr lang="en-US" dirty="0" err="1"/>
+              <a:t>AnzahlEvents</a:t>
+            </a:r>
+            <a:endParaRPr lang="en-DE" dirty="0"/>
+          </a:p>
+        </p:txBody>
+      </p:sp>
+    </p:spTree>
+    <p:extLst>
+      <p:ext uri="{BB962C8B-B14F-4D97-AF65-F5344CB8AC3E}">
+        <p14:creationId xmlns:p14="http://schemas.microsoft.com/office/powerpoint/2010/main" val="1379279332"/>
       </p:ext>
     </p:extLst>
   </p:cSld>

</xml_diff>